<commit_message>
Cambia color de fondo de presentacion
</commit_message>
<xml_diff>
--- a/Presentacion.pptx
+++ b/Presentacion.pptx
@@ -109,6 +109,11 @@
       </a:defRPr>
     </a:lvl9pPr>
   </p:defaultTextStyle>
+  <p:extLst>
+    <p:ext uri="{EFAFB233-063F-42B5-8137-9DF3F51BA10A}">
+      <p15:sldGuideLst xmlns:p15="http://schemas.microsoft.com/office/powerpoint/2012/main"/>
+    </p:ext>
+  </p:extLst>
 </p:presentation>
 </file>
 
@@ -3383,8 +3388,16 @@
 </file>
 
 <file path=ppt/slides/slide1.xml><?xml version="1.0" encoding="utf-8"?>
-<p:sld xmlns:a="http://schemas.openxmlformats.org/drawingml/2006/main" xmlns:r="http://schemas.openxmlformats.org/officeDocument/2006/relationships" xmlns:p="http://schemas.openxmlformats.org/presentationml/2006/main">
+<p:sld xmlns:a="http://schemas.openxmlformats.org/drawingml/2006/main" xmlns:r="http://schemas.openxmlformats.org/officeDocument/2006/relationships" xmlns:p="http://schemas.openxmlformats.org/presentationml/2006/main" showMasterSp="0">
   <p:cSld>
+    <p:bg>
+      <p:bgPr>
+        <a:solidFill>
+          <a:srgbClr val="006C15"/>
+        </a:solidFill>
+        <a:effectLst/>
+      </p:bgPr>
+    </p:bg>
     <p:spTree>
       <p:nvGrpSpPr>
         <p:cNvPr id="1" name=""/>
@@ -3409,7 +3422,11 @@
             <p:ph type="ctrTitle"/>
           </p:nvPr>
         </p:nvSpPr>
-        <p:spPr/>
+        <p:spPr>
+          <a:solidFill>
+            <a:srgbClr val="006C15"/>
+          </a:solidFill>
+        </p:spPr>
         <p:txBody>
           <a:bodyPr/>
           <a:lstStyle/>
@@ -3459,8 +3476,16 @@
 </file>
 
 <file path=ppt/slides/slide2.xml><?xml version="1.0" encoding="utf-8"?>
-<p:sld xmlns:a="http://schemas.openxmlformats.org/drawingml/2006/main" xmlns:r="http://schemas.openxmlformats.org/officeDocument/2006/relationships" xmlns:p="http://schemas.openxmlformats.org/presentationml/2006/main">
+<p:sld xmlns:a="http://schemas.openxmlformats.org/drawingml/2006/main" xmlns:r="http://schemas.openxmlformats.org/officeDocument/2006/relationships" xmlns:p="http://schemas.openxmlformats.org/presentationml/2006/main" showMasterSp="0">
   <p:cSld>
+    <p:bg>
+      <p:bgPr>
+        <a:solidFill>
+          <a:srgbClr val="006C15"/>
+        </a:solidFill>
+        <a:effectLst/>
+      </p:bgPr>
+    </p:bg>
     <p:spTree>
       <p:nvGrpSpPr>
         <p:cNvPr id="1" name=""/>
@@ -3757,8 +3782,16 @@
 </file>
 
 <file path=ppt/slides/slide3.xml><?xml version="1.0" encoding="utf-8"?>
-<p:sld xmlns:a="http://schemas.openxmlformats.org/drawingml/2006/main" xmlns:r="http://schemas.openxmlformats.org/officeDocument/2006/relationships" xmlns:p="http://schemas.openxmlformats.org/presentationml/2006/main">
+<p:sld xmlns:a="http://schemas.openxmlformats.org/drawingml/2006/main" xmlns:r="http://schemas.openxmlformats.org/officeDocument/2006/relationships" xmlns:p="http://schemas.openxmlformats.org/presentationml/2006/main" showMasterSp="0">
   <p:cSld>
+    <p:bg>
+      <p:bgPr>
+        <a:solidFill>
+          <a:srgbClr val="006C15"/>
+        </a:solidFill>
+        <a:effectLst/>
+      </p:bgPr>
+    </p:bg>
     <p:spTree>
       <p:nvGrpSpPr>
         <p:cNvPr id="1" name=""/>
@@ -3862,8 +3895,16 @@
 </file>
 
 <file path=ppt/slides/slide4.xml><?xml version="1.0" encoding="utf-8"?>
-<p:sld xmlns:a="http://schemas.openxmlformats.org/drawingml/2006/main" xmlns:r="http://schemas.openxmlformats.org/officeDocument/2006/relationships" xmlns:p="http://schemas.openxmlformats.org/presentationml/2006/main">
+<p:sld xmlns:a="http://schemas.openxmlformats.org/drawingml/2006/main" xmlns:r="http://schemas.openxmlformats.org/officeDocument/2006/relationships" xmlns:p="http://schemas.openxmlformats.org/presentationml/2006/main" showMasterSp="0">
   <p:cSld>
+    <p:bg>
+      <p:bgPr>
+        <a:solidFill>
+          <a:srgbClr val="006C15"/>
+        </a:solidFill>
+        <a:effectLst/>
+      </p:bgPr>
+    </p:bg>
     <p:spTree>
       <p:nvGrpSpPr>
         <p:cNvPr id="1" name=""/>
@@ -4079,8 +4120,16 @@
 </file>
 
 <file path=ppt/slides/slide5.xml><?xml version="1.0" encoding="utf-8"?>
-<p:sld xmlns:a="http://schemas.openxmlformats.org/drawingml/2006/main" xmlns:r="http://schemas.openxmlformats.org/officeDocument/2006/relationships" xmlns:p="http://schemas.openxmlformats.org/presentationml/2006/main">
+<p:sld xmlns:a="http://schemas.openxmlformats.org/drawingml/2006/main" xmlns:r="http://schemas.openxmlformats.org/officeDocument/2006/relationships" xmlns:p="http://schemas.openxmlformats.org/presentationml/2006/main" showMasterSp="0">
   <p:cSld>
+    <p:bg>
+      <p:bgPr>
+        <a:solidFill>
+          <a:srgbClr val="006C15"/>
+        </a:solidFill>
+        <a:effectLst/>
+      </p:bgPr>
+    </p:bg>
     <p:spTree>
       <p:nvGrpSpPr>
         <p:cNvPr id="1" name=""/>
@@ -4416,8 +4465,16 @@
 </file>
 
 <file path=ppt/slides/slide6.xml><?xml version="1.0" encoding="utf-8"?>
-<p:sld xmlns:a="http://schemas.openxmlformats.org/drawingml/2006/main" xmlns:r="http://schemas.openxmlformats.org/officeDocument/2006/relationships" xmlns:p="http://schemas.openxmlformats.org/presentationml/2006/main">
+<p:sld xmlns:a="http://schemas.openxmlformats.org/drawingml/2006/main" xmlns:r="http://schemas.openxmlformats.org/officeDocument/2006/relationships" xmlns:p="http://schemas.openxmlformats.org/presentationml/2006/main" showMasterSp="0">
   <p:cSld>
+    <p:bg>
+      <p:bgPr>
+        <a:solidFill>
+          <a:srgbClr val="006C15"/>
+        </a:solidFill>
+        <a:effectLst/>
+      </p:bgPr>
+    </p:bg>
     <p:spTree>
       <p:nvGrpSpPr>
         <p:cNvPr id="1" name=""/>
@@ -4441,7 +4498,7 @@
         <p:spPr>
           <a:xfrm>
             <a:off x="1081825" y="643944"/>
-            <a:ext cx="10315978" cy="2400657"/>
+            <a:ext cx="10315978" cy="1631216"/>
           </a:xfrm>
           <a:prstGeom prst="rect">
             <a:avLst/>
@@ -4455,12 +4512,24 @@
           <a:lstStyle/>
           <a:p>
             <a:r>
+              <a:rPr lang="en-US" sz="5000" dirty="0" err="1" smtClean="0"/>
+              <a:t>Continuamos</a:t>
+            </a:r>
+            <a:r>
               <a:rPr lang="en-US" sz="5000" dirty="0" smtClean="0"/>
-              <a:t>A </a:t>
+              <a:t> con </a:t>
             </a:r>
             <a:r>
               <a:rPr lang="en-US" sz="5000" dirty="0" err="1" smtClean="0"/>
-              <a:t>continuaci</a:t>
+              <a:t>una</a:t>
+            </a:r>
+            <a:r>
+              <a:rPr lang="en-US" sz="5000" dirty="0" smtClean="0"/>
+              <a:t> </a:t>
+            </a:r>
+            <a:r>
+              <a:rPr lang="en-US" sz="5000" dirty="0" err="1" smtClean="0"/>
+              <a:t>demostraci</a:t>
             </a:r>
             <a:r>
               <a:rPr lang="es-AR" sz="5000" dirty="0" err="1"/>
@@ -4468,47 +4537,7 @@
             </a:r>
             <a:r>
               <a:rPr lang="en-US" sz="5000" dirty="0" smtClean="0"/>
-              <a:t>n se </a:t>
-            </a:r>
-            <a:r>
-              <a:rPr lang="en-US" sz="5000" dirty="0" err="1" smtClean="0"/>
-              <a:t>hará</a:t>
-            </a:r>
-            <a:r>
-              <a:rPr lang="en-US" sz="5000" dirty="0" smtClean="0"/>
-              <a:t> </a:t>
-            </a:r>
-            <a:r>
-              <a:rPr lang="en-US" sz="5000" dirty="0" err="1" smtClean="0"/>
-              <a:t>una</a:t>
-            </a:r>
-            <a:r>
-              <a:rPr lang="en-US" sz="5000" dirty="0" smtClean="0"/>
-              <a:t> </a:t>
-            </a:r>
-            <a:r>
-              <a:rPr lang="en-US" sz="5000" dirty="0" err="1" smtClean="0"/>
-              <a:t>demostración</a:t>
-            </a:r>
-            <a:r>
-              <a:rPr lang="en-US" sz="5000" dirty="0" smtClean="0"/>
-              <a:t> del </a:t>
-            </a:r>
-            <a:r>
-              <a:rPr lang="en-US" sz="5000" dirty="0" err="1" smtClean="0"/>
-              <a:t>funcionamiento</a:t>
-            </a:r>
-            <a:r>
-              <a:rPr lang="en-US" sz="5000" dirty="0" smtClean="0"/>
-              <a:t> de la </a:t>
-            </a:r>
-            <a:r>
-              <a:rPr lang="en-US" sz="5000" dirty="0" err="1" smtClean="0"/>
-              <a:t>aplicación</a:t>
-            </a:r>
-            <a:r>
-              <a:rPr lang="en-US" sz="5000" dirty="0" smtClean="0"/>
-              <a:t>.</a:t>
+              <a:t>n.</a:t>
             </a:r>
             <a:endParaRPr lang="es-AR" sz="5000" dirty="0"/>
           </a:p>

</xml_diff>